<commit_message>
Avances proyecto modulo 2
</commit_message>
<xml_diff>
--- a/Proyecto_modulo2.pptx
+++ b/Proyecto_modulo2.pptx
@@ -9,6 +9,11 @@
     <p:sldId id="257" r:id="rId3"/>
     <p:sldId id="258" r:id="rId4"/>
     <p:sldId id="259" r:id="rId5"/>
+    <p:sldId id="260" r:id="rId6"/>
+    <p:sldId id="261" r:id="rId7"/>
+    <p:sldId id="262" r:id="rId8"/>
+    <p:sldId id="263" r:id="rId9"/>
+    <p:sldId id="264" r:id="rId10"/>
   </p:sldIdLst>
   <p:sldSz cx="12192000" cy="6858000"/>
   <p:notesSz cx="6858000" cy="9144000"/>
@@ -3996,6 +4001,14 @@
 <file path=ppt/slides/slide2.xml><?xml version="1.0" encoding="utf-8"?>
 <p:sld xmlns:a="http://schemas.openxmlformats.org/drawingml/2006/main" xmlns:r="http://schemas.openxmlformats.org/officeDocument/2006/relationships" xmlns:p="http://schemas.openxmlformats.org/presentationml/2006/main">
   <p:cSld>
+    <p:bg>
+      <p:bgPr>
+        <a:solidFill>
+          <a:schemeClr val="bg1"/>
+        </a:solidFill>
+        <a:effectLst/>
+      </p:bgPr>
+    </p:bg>
     <p:spTree>
       <p:nvGrpSpPr>
         <p:cNvPr id="1" name=""/>
@@ -4012,6 +4025,244 @@
       </p:grpSpPr>
       <p:sp>
         <p:nvSpPr>
+          <p:cNvPr id="13" name="Rectangle 12">
+            <a:extLst>
+              <a:ext uri="{FF2B5EF4-FFF2-40B4-BE49-F238E27FC236}">
+                <a16:creationId xmlns:a16="http://schemas.microsoft.com/office/drawing/2014/main" id="{C7FA33FF-088D-4F16-95A2-2C64D353DEA8}"/>
+              </a:ext>
+              <a:ext uri="{C183D7F6-B498-43B3-948B-1728B52AA6E4}">
+                <adec:decorative xmlns:adec="http://schemas.microsoft.com/office/drawing/2017/decorative" val="1"/>
+              </a:ext>
+            </a:extLst>
+          </p:cNvPr>
+          <p:cNvSpPr>
+            <a:spLocks noGrp="1" noRot="1" noChangeAspect="1" noMove="1" noResize="1" noEditPoints="1" noAdjustHandles="1" noChangeArrowheads="1" noChangeShapeType="1" noTextEdit="1"/>
+          </p:cNvSpPr>
+          <p:nvPr>
+            <p:extLst>
+              <p:ext uri="{386F3935-93C4-4BCD-93E2-E3B085C9AB24}">
+                <p16:designElem xmlns:p16="http://schemas.microsoft.com/office/powerpoint/2015/main" val="1"/>
+              </p:ext>
+            </p:extLst>
+          </p:nvPr>
+        </p:nvSpPr>
+        <p:spPr>
+          <a:xfrm>
+            <a:off x="1524" y="0"/>
+            <a:ext cx="12188952" cy="6858000"/>
+          </a:xfrm>
+          <a:prstGeom prst="rect">
+            <a:avLst/>
+          </a:prstGeom>
+          <a:solidFill>
+            <a:schemeClr val="tx1"/>
+          </a:solidFill>
+          <a:ln>
+            <a:noFill/>
+          </a:ln>
+        </p:spPr>
+        <p:style>
+          <a:lnRef idx="2">
+            <a:schemeClr val="accent1">
+              <a:shade val="50000"/>
+            </a:schemeClr>
+          </a:lnRef>
+          <a:fillRef idx="1">
+            <a:schemeClr val="accent1"/>
+          </a:fillRef>
+          <a:effectRef idx="0">
+            <a:schemeClr val="accent1"/>
+          </a:effectRef>
+          <a:fontRef idx="minor">
+            <a:schemeClr val="lt1"/>
+          </a:fontRef>
+        </p:style>
+        <p:txBody>
+          <a:bodyPr rtlCol="0" anchor="ctr"/>
+          <a:lstStyle/>
+          <a:p>
+            <a:pPr algn="ctr"/>
+            <a:endParaRPr lang="en-US"/>
+          </a:p>
+        </p:txBody>
+      </p:sp>
+      <p:sp>
+        <p:nvSpPr>
+          <p:cNvPr id="15" name="Rectangle 14">
+            <a:extLst>
+              <a:ext uri="{FF2B5EF4-FFF2-40B4-BE49-F238E27FC236}">
+                <a16:creationId xmlns:a16="http://schemas.microsoft.com/office/drawing/2014/main" id="{A376EFB1-01CF-419F-ABF1-2AF02BBFCBD1}"/>
+              </a:ext>
+              <a:ext uri="{C183D7F6-B498-43B3-948B-1728B52AA6E4}">
+                <adec:decorative xmlns:adec="http://schemas.microsoft.com/office/drawing/2017/decorative" val="1"/>
+              </a:ext>
+            </a:extLst>
+          </p:cNvPr>
+          <p:cNvSpPr>
+            <a:spLocks noGrp="1" noRot="1" noChangeAspect="1" noMove="1" noResize="1" noEditPoints="1" noAdjustHandles="1" noChangeArrowheads="1" noChangeShapeType="1" noTextEdit="1"/>
+          </p:cNvSpPr>
+          <p:nvPr>
+            <p:extLst>
+              <p:ext uri="{386F3935-93C4-4BCD-93E2-E3B085C9AB24}">
+                <p16:designElem xmlns:p16="http://schemas.microsoft.com/office/powerpoint/2015/main" val="1"/>
+              </p:ext>
+            </p:extLst>
+          </p:nvPr>
+        </p:nvSpPr>
+        <p:spPr>
+          <a:xfrm>
+            <a:off x="6050604" y="0"/>
+            <a:ext cx="6141396" cy="6858000"/>
+          </a:xfrm>
+          <a:prstGeom prst="rect">
+            <a:avLst/>
+          </a:prstGeom>
+          <a:solidFill>
+            <a:schemeClr val="bg1">
+              <a:alpha val="81000"/>
+            </a:schemeClr>
+          </a:solidFill>
+          <a:ln>
+            <a:noFill/>
+          </a:ln>
+        </p:spPr>
+        <p:style>
+          <a:lnRef idx="2">
+            <a:schemeClr val="accent1">
+              <a:shade val="50000"/>
+            </a:schemeClr>
+          </a:lnRef>
+          <a:fillRef idx="1">
+            <a:schemeClr val="accent1"/>
+          </a:fillRef>
+          <a:effectRef idx="0">
+            <a:schemeClr val="accent1"/>
+          </a:effectRef>
+          <a:fontRef idx="minor">
+            <a:schemeClr val="lt1"/>
+          </a:fontRef>
+        </p:style>
+        <p:txBody>
+          <a:bodyPr rtlCol="0" anchor="ctr"/>
+          <a:lstStyle/>
+          <a:p>
+            <a:pPr algn="ctr"/>
+            <a:endParaRPr lang="en-US"/>
+          </a:p>
+        </p:txBody>
+      </p:sp>
+      <p:sp>
+        <p:nvSpPr>
+          <p:cNvPr id="17" name="Freeform: Shape 16">
+            <a:extLst>
+              <a:ext uri="{FF2B5EF4-FFF2-40B4-BE49-F238E27FC236}">
+                <a16:creationId xmlns:a16="http://schemas.microsoft.com/office/drawing/2014/main" id="{FF9DEA15-78BD-4750-AA18-B9F28A6D5AB8}"/>
+              </a:ext>
+              <a:ext uri="{C183D7F6-B498-43B3-948B-1728B52AA6E4}">
+                <adec:decorative xmlns:adec="http://schemas.microsoft.com/office/drawing/2017/decorative" val="1"/>
+              </a:ext>
+            </a:extLst>
+          </p:cNvPr>
+          <p:cNvSpPr>
+            <a:spLocks noGrp="1" noRot="1" noChangeAspect="1" noMove="1" noResize="1" noEditPoints="1" noAdjustHandles="1" noChangeArrowheads="1" noChangeShapeType="1" noTextEdit="1"/>
+          </p:cNvSpPr>
+          <p:nvPr>
+            <p:extLst>
+              <p:ext uri="{386F3935-93C4-4BCD-93E2-E3B085C9AB24}">
+                <p16:designElem xmlns:p16="http://schemas.microsoft.com/office/powerpoint/2015/main" val="1"/>
+              </p:ext>
+            </p:extLst>
+          </p:nvPr>
+        </p:nvSpPr>
+        <p:spPr>
+          <a:xfrm>
+            <a:off x="6050604" y="0"/>
+            <a:ext cx="4319042" cy="6858000"/>
+          </a:xfrm>
+          <a:custGeom>
+            <a:avLst/>
+            <a:gdLst>
+              <a:gd name="connsiteX0" fmla="*/ 0 w 4319042"/>
+              <a:gd name="connsiteY0" fmla="*/ 0 h 6858000"/>
+              <a:gd name="connsiteX1" fmla="*/ 1142888 w 4319042"/>
+              <a:gd name="connsiteY1" fmla="*/ 0 h 6858000"/>
+              <a:gd name="connsiteX2" fmla="*/ 4319042 w 4319042"/>
+              <a:gd name="connsiteY2" fmla="*/ 6858000 h 6858000"/>
+              <a:gd name="connsiteX3" fmla="*/ 0 w 4319042"/>
+              <a:gd name="connsiteY3" fmla="*/ 6858000 h 6858000"/>
+            </a:gdLst>
+            <a:ahLst/>
+            <a:cxnLst>
+              <a:cxn ang="0">
+                <a:pos x="connsiteX0" y="connsiteY0"/>
+              </a:cxn>
+              <a:cxn ang="0">
+                <a:pos x="connsiteX1" y="connsiteY1"/>
+              </a:cxn>
+              <a:cxn ang="0">
+                <a:pos x="connsiteX2" y="connsiteY2"/>
+              </a:cxn>
+              <a:cxn ang="0">
+                <a:pos x="connsiteX3" y="connsiteY3"/>
+              </a:cxn>
+            </a:cxnLst>
+            <a:rect l="l" t="t" r="r" b="b"/>
+            <a:pathLst>
+              <a:path w="4319042" h="6858000">
+                <a:moveTo>
+                  <a:pt x="0" y="0"/>
+                </a:moveTo>
+                <a:lnTo>
+                  <a:pt x="1142888" y="0"/>
+                </a:lnTo>
+                <a:lnTo>
+                  <a:pt x="4319042" y="6858000"/>
+                </a:lnTo>
+                <a:lnTo>
+                  <a:pt x="0" y="6858000"/>
+                </a:lnTo>
+                <a:close/>
+              </a:path>
+            </a:pathLst>
+          </a:custGeom>
+          <a:solidFill>
+            <a:schemeClr val="bg1">
+              <a:alpha val="35000"/>
+            </a:schemeClr>
+          </a:solidFill>
+          <a:ln>
+            <a:noFill/>
+          </a:ln>
+        </p:spPr>
+        <p:style>
+          <a:lnRef idx="2">
+            <a:schemeClr val="accent1">
+              <a:shade val="50000"/>
+            </a:schemeClr>
+          </a:lnRef>
+          <a:fillRef idx="1">
+            <a:schemeClr val="accent1"/>
+          </a:fillRef>
+          <a:effectRef idx="0">
+            <a:schemeClr val="accent1"/>
+          </a:effectRef>
+          <a:fontRef idx="minor">
+            <a:schemeClr val="lt1"/>
+          </a:fontRef>
+        </p:style>
+        <p:txBody>
+          <a:bodyPr wrap="square" rtlCol="0" anchor="ctr">
+            <a:noAutofit/>
+          </a:bodyPr>
+          <a:lstStyle/>
+          <a:p>
+            <a:pPr algn="ctr"/>
+            <a:endParaRPr lang="en-US"/>
+          </a:p>
+        </p:txBody>
+      </p:sp>
+      <p:sp>
+        <p:nvSpPr>
           <p:cNvPr id="2" name="Título 1">
             <a:extLst>
               <a:ext uri="{FF2B5EF4-FFF2-40B4-BE49-F238E27FC236}">
@@ -4026,21 +4277,83 @@
             <p:ph type="title"/>
           </p:nvPr>
         </p:nvSpPr>
-        <p:spPr/>
-        <p:txBody>
-          <a:bodyPr/>
-          <a:lstStyle/>
-          <a:p>
-            <a:endParaRPr lang="es-MX"/>
-          </a:p>
-        </p:txBody>
-      </p:sp>
-      <p:sp>
-        <p:nvSpPr>
-          <p:cNvPr id="3" name="Marcador de contenido 2">
-            <a:extLst>
-              <a:ext uri="{FF2B5EF4-FFF2-40B4-BE49-F238E27FC236}">
-                <a16:creationId xmlns:a16="http://schemas.microsoft.com/office/drawing/2014/main" id="{9DC74486-9415-431E-8F1C-CF51E0EA6F4C}"/>
+        <p:spPr>
+          <a:xfrm>
+            <a:off x="6392598" y="640263"/>
+            <a:ext cx="5221266" cy="1344975"/>
+          </a:xfrm>
+        </p:spPr>
+        <p:txBody>
+          <a:bodyPr vert="horz" lIns="91440" tIns="45720" rIns="91440" bIns="45720" rtlCol="0" anchor="ctr">
+            <a:normAutofit/>
+          </a:bodyPr>
+          <a:lstStyle/>
+          <a:p>
+            <a:r>
+              <a:rPr lang="en-US" sz="4000" kern="1200">
+                <a:solidFill>
+                  <a:schemeClr val="tx1"/>
+                </a:solidFill>
+                <a:latin typeface="+mj-lt"/>
+                <a:ea typeface="+mj-ea"/>
+                <a:cs typeface="+mj-cs"/>
+              </a:rPr>
+              <a:t>Tabla de Contenido</a:t>
+            </a:r>
+          </a:p>
+        </p:txBody>
+      </p:sp>
+      <p:pic>
+        <p:nvPicPr>
+          <p:cNvPr id="8" name="Imagen 7">
+            <a:extLst>
+              <a:ext uri="{FF2B5EF4-FFF2-40B4-BE49-F238E27FC236}">
+                <a16:creationId xmlns:a16="http://schemas.microsoft.com/office/drawing/2014/main" id="{04B689DD-6CBE-4EFD-AD00-19D3AC93A6A7}"/>
+              </a:ext>
+            </a:extLst>
+          </p:cNvPr>
+          <p:cNvPicPr>
+            <a:picLocks noChangeAspect="1"/>
+          </p:cNvPicPr>
+          <p:nvPr/>
+        </p:nvPicPr>
+        <p:blipFill>
+          <a:blip r:embed="rId2">
+            <a:extLst>
+              <a:ext uri="{BEBA8EAE-BF5A-486C-A8C5-ECC9F3942E4B}">
+                <a14:imgProps xmlns:a14="http://schemas.microsoft.com/office/drawing/2010/main">
+                  <a14:imgLayer r:embed="rId3">
+                    <a14:imgEffect>
+                      <a14:colorTemperature colorTemp="5841"/>
+                    </a14:imgEffect>
+                  </a14:imgLayer>
+                </a14:imgProps>
+              </a:ext>
+              <a:ext uri="{28A0092B-C50C-407E-A947-70E740481C1C}">
+                <a14:useLocalDpi xmlns:a14="http://schemas.microsoft.com/office/drawing/2010/main" val="0"/>
+              </a:ext>
+            </a:extLst>
+          </a:blip>
+          <a:stretch>
+            <a:fillRect/>
+          </a:stretch>
+        </p:blipFill>
+        <p:spPr>
+          <a:xfrm>
+            <a:off x="484632" y="787907"/>
+            <a:ext cx="5126736" cy="5126736"/>
+          </a:xfrm>
+          <a:prstGeom prst="rect">
+            <a:avLst/>
+          </a:prstGeom>
+        </p:spPr>
+      </p:pic>
+      <p:sp>
+        <p:nvSpPr>
+          <p:cNvPr id="7" name="Marcador de contenido 6">
+            <a:extLst>
+              <a:ext uri="{FF2B5EF4-FFF2-40B4-BE49-F238E27FC236}">
+                <a16:creationId xmlns:a16="http://schemas.microsoft.com/office/drawing/2014/main" id="{E259E2F5-D98A-4DFF-8FE2-40B0EA603CAC}"/>
               </a:ext>
             </a:extLst>
           </p:cNvPr>
@@ -4051,12 +4364,99 @@
             <p:ph idx="1"/>
           </p:nvPr>
         </p:nvSpPr>
-        <p:spPr/>
-        <p:txBody>
-          <a:bodyPr/>
-          <a:lstStyle/>
-          <a:p>
-            <a:endParaRPr lang="es-MX"/>
+        <p:spPr>
+          <a:xfrm>
+            <a:off x="6391903" y="2121763"/>
+            <a:ext cx="5235490" cy="3773010"/>
+          </a:xfrm>
+        </p:spPr>
+        <p:txBody>
+          <a:bodyPr vert="horz" lIns="91440" tIns="45720" rIns="91440" bIns="45720" rtlCol="0">
+            <a:normAutofit/>
+          </a:bodyPr>
+          <a:lstStyle/>
+          <a:p>
+            <a:pPr marL="285750"/>
+            <a:r>
+              <a:rPr lang="en-US" dirty="0" err="1"/>
+              <a:t>Objetivos</a:t>
+            </a:r>
+            <a:endParaRPr lang="en-US" dirty="0"/>
+          </a:p>
+          <a:p>
+            <a:pPr marL="285750"/>
+            <a:r>
+              <a:rPr lang="en-US" dirty="0" err="1"/>
+              <a:t>Modelo</a:t>
+            </a:r>
+            <a:r>
+              <a:rPr lang="en-US" dirty="0"/>
+              <a:t> del </a:t>
+            </a:r>
+            <a:r>
+              <a:rPr lang="en-US" dirty="0" err="1"/>
+              <a:t>problema</a:t>
+            </a:r>
+            <a:endParaRPr lang="en-US" dirty="0"/>
+          </a:p>
+          <a:p>
+            <a:pPr marL="285750"/>
+            <a:r>
+              <a:rPr lang="en-US" dirty="0" err="1"/>
+              <a:t>Solución</a:t>
+            </a:r>
+            <a:r>
+              <a:rPr lang="en-US" dirty="0"/>
+              <a:t> del </a:t>
+            </a:r>
+            <a:r>
+              <a:rPr lang="en-US" dirty="0" err="1"/>
+              <a:t>problema</a:t>
+            </a:r>
+            <a:endParaRPr lang="en-US" dirty="0"/>
+          </a:p>
+          <a:p>
+            <a:pPr marL="285750"/>
+            <a:r>
+              <a:rPr lang="en-US" dirty="0" err="1"/>
+              <a:t>Visualización</a:t>
+            </a:r>
+            <a:r>
+              <a:rPr lang="en-US" dirty="0"/>
+              <a:t> del </a:t>
+            </a:r>
+            <a:r>
+              <a:rPr lang="en-US" dirty="0" err="1"/>
+              <a:t>problema</a:t>
+            </a:r>
+            <a:r>
+              <a:rPr lang="en-US" dirty="0"/>
+              <a:t> (</a:t>
+            </a:r>
+            <a:r>
+              <a:rPr lang="en-US" dirty="0" err="1"/>
+              <a:t>Graficar</a:t>
+            </a:r>
+            <a:r>
+              <a:rPr lang="en-US" dirty="0"/>
+              <a:t>)</a:t>
+            </a:r>
+          </a:p>
+          <a:p>
+            <a:pPr marL="285750"/>
+            <a:r>
+              <a:rPr lang="en-US" dirty="0" err="1"/>
+              <a:t>Conclusiones</a:t>
+            </a:r>
+            <a:endParaRPr lang="en-US" dirty="0"/>
+          </a:p>
+          <a:p>
+            <a:pPr marL="285750"/>
+            <a:r>
+              <a:rPr lang="en-US" dirty="0" err="1"/>
+              <a:t>Referencias</a:t>
+            </a:r>
+            <a:endParaRPr lang="en-US" dirty="0"/>
           </a:p>
         </p:txBody>
       </p:sp>
@@ -4064,6 +4464,757 @@
     <p:extLst>
       <p:ext uri="{BB962C8B-B14F-4D97-AF65-F5344CB8AC3E}">
         <p14:creationId xmlns:p14="http://schemas.microsoft.com/office/powerpoint/2010/main" val="2310397840"/>
+      </p:ext>
+    </p:extLst>
+  </p:cSld>
+  <p:clrMapOvr>
+    <a:overrideClrMapping bg1="dk1" tx1="lt1" bg2="dk2" tx2="lt2" accent1="accent1" accent2="accent2" accent3="accent3" accent4="accent4" accent5="accent5" accent6="accent6" hlink="hlink" folHlink="folHlink"/>
+  </p:clrMapOvr>
+</p:sld>
+</file>
+
+<file path=ppt/slides/slide3.xml><?xml version="1.0" encoding="utf-8"?>
+<p:sld xmlns:a="http://schemas.openxmlformats.org/drawingml/2006/main" xmlns:r="http://schemas.openxmlformats.org/officeDocument/2006/relationships" xmlns:p="http://schemas.openxmlformats.org/presentationml/2006/main">
+  <p:cSld>
+    <p:bg>
+      <p:bgPr>
+        <a:solidFill>
+          <a:schemeClr val="bg1">
+            <a:tint val="95000"/>
+            <a:satMod val="170000"/>
+          </a:schemeClr>
+        </a:solidFill>
+        <a:effectLst/>
+      </p:bgPr>
+    </p:bg>
+    <p:spTree>
+      <p:nvGrpSpPr>
+        <p:cNvPr id="1" name=""/>
+        <p:cNvGrpSpPr/>
+        <p:nvPr/>
+      </p:nvGrpSpPr>
+      <p:grpSpPr>
+        <a:xfrm>
+          <a:off x="0" y="0"/>
+          <a:ext cx="0" cy="0"/>
+          <a:chOff x="0" y="0"/>
+          <a:chExt cx="0" cy="0"/>
+        </a:xfrm>
+      </p:grpSpPr>
+      <p:sp>
+        <p:nvSpPr>
+          <p:cNvPr id="2" name="Título 1">
+            <a:extLst>
+              <a:ext uri="{FF2B5EF4-FFF2-40B4-BE49-F238E27FC236}">
+                <a16:creationId xmlns:a16="http://schemas.microsoft.com/office/drawing/2014/main" id="{35346DB6-E279-42EF-B0D8-91E91F27AD9C}"/>
+              </a:ext>
+            </a:extLst>
+          </p:cNvPr>
+          <p:cNvSpPr>
+            <a:spLocks noGrp="1"/>
+          </p:cNvSpPr>
+          <p:nvPr>
+            <p:ph type="title"/>
+          </p:nvPr>
+        </p:nvSpPr>
+        <p:spPr>
+          <a:xfrm>
+            <a:off x="762001" y="803325"/>
+            <a:ext cx="5314536" cy="1325563"/>
+          </a:xfrm>
+        </p:spPr>
+        <p:txBody>
+          <a:bodyPr>
+            <a:normAutofit/>
+          </a:bodyPr>
+          <a:lstStyle/>
+          <a:p>
+            <a:r>
+              <a:rPr lang="es-ES" sz="4800" dirty="0"/>
+              <a:t>Objetivo General</a:t>
+            </a:r>
+            <a:endParaRPr lang="es-MX" sz="4800" dirty="0"/>
+          </a:p>
+        </p:txBody>
+      </p:sp>
+      <p:sp>
+        <p:nvSpPr>
+          <p:cNvPr id="3" name="Marcador de contenido 2">
+            <a:extLst>
+              <a:ext uri="{FF2B5EF4-FFF2-40B4-BE49-F238E27FC236}">
+                <a16:creationId xmlns:a16="http://schemas.microsoft.com/office/drawing/2014/main" id="{00FC6118-681F-464B-B829-6CB76C53FFCC}"/>
+              </a:ext>
+            </a:extLst>
+          </p:cNvPr>
+          <p:cNvSpPr>
+            <a:spLocks noGrp="1"/>
+          </p:cNvSpPr>
+          <p:nvPr>
+            <p:ph idx="1"/>
+          </p:nvPr>
+        </p:nvSpPr>
+        <p:spPr>
+          <a:xfrm>
+            <a:off x="762000" y="2279018"/>
+            <a:ext cx="5314543" cy="3375920"/>
+          </a:xfrm>
+        </p:spPr>
+        <p:txBody>
+          <a:bodyPr anchor="t">
+            <a:normAutofit/>
+          </a:bodyPr>
+          <a:lstStyle/>
+          <a:p>
+            <a:r>
+              <a:rPr lang="es-ES" dirty="0"/>
+              <a:t>El objetivo general del proyecto es poder conocer el volumen que comprende un tazón de un paraboloide, mediante la integración de Montecarlo.</a:t>
+            </a:r>
+          </a:p>
+        </p:txBody>
+      </p:sp>
+      <p:sp>
+        <p:nvSpPr>
+          <p:cNvPr id="12" name="Freeform: Shape 11">
+            <a:extLst>
+              <a:ext uri="{FF2B5EF4-FFF2-40B4-BE49-F238E27FC236}">
+                <a16:creationId xmlns:a16="http://schemas.microsoft.com/office/drawing/2014/main" id="{CF62D2A7-8207-488C-9F46-316BA81A16C8}"/>
+              </a:ext>
+              <a:ext uri="{C183D7F6-B498-43B3-948B-1728B52AA6E4}">
+                <adec:decorative xmlns:adec="http://schemas.microsoft.com/office/drawing/2017/decorative" val="1"/>
+              </a:ext>
+            </a:extLst>
+          </p:cNvPr>
+          <p:cNvSpPr>
+            <a:spLocks noGrp="1" noRot="1" noChangeAspect="1" noMove="1" noResize="1" noEditPoints="1" noAdjustHandles="1" noChangeArrowheads="1" noChangeShapeType="1" noTextEdit="1"/>
+          </p:cNvSpPr>
+          <p:nvPr>
+            <p:extLst>
+              <p:ext uri="{386F3935-93C4-4BCD-93E2-E3B085C9AB24}">
+                <p16:designElem xmlns:p16="http://schemas.microsoft.com/office/powerpoint/2015/main" val="1"/>
+              </p:ext>
+            </p:extLst>
+          </p:nvPr>
+        </p:nvSpPr>
+        <p:spPr>
+          <a:xfrm flipH="1">
+            <a:off x="6582780" y="-2008"/>
+            <a:ext cx="5609220" cy="5840278"/>
+          </a:xfrm>
+          <a:custGeom>
+            <a:avLst/>
+            <a:gdLst>
+              <a:gd name="connsiteX0" fmla="*/ 0 w 5609220"/>
+              <a:gd name="connsiteY0" fmla="*/ 0 h 5840278"/>
+              <a:gd name="connsiteX1" fmla="*/ 4637091 w 5609220"/>
+              <a:gd name="connsiteY1" fmla="*/ 0 h 5840278"/>
+              <a:gd name="connsiteX2" fmla="*/ 4822569 w 5609220"/>
+              <a:gd name="connsiteY2" fmla="*/ 204077 h 5840278"/>
+              <a:gd name="connsiteX3" fmla="*/ 5609220 w 5609220"/>
+              <a:gd name="connsiteY3" fmla="*/ 2395363 h 5840278"/>
+              <a:gd name="connsiteX4" fmla="*/ 2164305 w 5609220"/>
+              <a:gd name="connsiteY4" fmla="*/ 5840278 h 5840278"/>
+              <a:gd name="connsiteX5" fmla="*/ 238220 w 5609220"/>
+              <a:gd name="connsiteY5" fmla="*/ 5251941 h 5840278"/>
+              <a:gd name="connsiteX6" fmla="*/ 0 w 5609220"/>
+              <a:gd name="connsiteY6" fmla="*/ 5073803 h 5840278"/>
+            </a:gdLst>
+            <a:ahLst/>
+            <a:cxnLst>
+              <a:cxn ang="0">
+                <a:pos x="connsiteX0" y="connsiteY0"/>
+              </a:cxn>
+              <a:cxn ang="0">
+                <a:pos x="connsiteX1" y="connsiteY1"/>
+              </a:cxn>
+              <a:cxn ang="0">
+                <a:pos x="connsiteX2" y="connsiteY2"/>
+              </a:cxn>
+              <a:cxn ang="0">
+                <a:pos x="connsiteX3" y="connsiteY3"/>
+              </a:cxn>
+              <a:cxn ang="0">
+                <a:pos x="connsiteX4" y="connsiteY4"/>
+              </a:cxn>
+              <a:cxn ang="0">
+                <a:pos x="connsiteX5" y="connsiteY5"/>
+              </a:cxn>
+              <a:cxn ang="0">
+                <a:pos x="connsiteX6" y="connsiteY6"/>
+              </a:cxn>
+            </a:cxnLst>
+            <a:rect l="l" t="t" r="r" b="b"/>
+            <a:pathLst>
+              <a:path w="5609220" h="5840278">
+                <a:moveTo>
+                  <a:pt x="0" y="0"/>
+                </a:moveTo>
+                <a:lnTo>
+                  <a:pt x="4637091" y="0"/>
+                </a:lnTo>
+                <a:lnTo>
+                  <a:pt x="4822569" y="204077"/>
+                </a:lnTo>
+                <a:cubicBezTo>
+                  <a:pt x="5314007" y="799562"/>
+                  <a:pt x="5609220" y="1562987"/>
+                  <a:pt x="5609220" y="2395363"/>
+                </a:cubicBezTo>
+                <a:cubicBezTo>
+                  <a:pt x="5609220" y="4297937"/>
+                  <a:pt x="4066879" y="5840278"/>
+                  <a:pt x="2164305" y="5840278"/>
+                </a:cubicBezTo>
+                <a:cubicBezTo>
+                  <a:pt x="1450840" y="5840278"/>
+                  <a:pt x="788032" y="5623387"/>
+                  <a:pt x="238220" y="5251941"/>
+                </a:cubicBezTo>
+                <a:lnTo>
+                  <a:pt x="0" y="5073803"/>
+                </a:lnTo>
+                <a:close/>
+              </a:path>
+            </a:pathLst>
+          </a:custGeom>
+          <a:solidFill>
+            <a:srgbClr val="FFFFFF">
+              <a:alpha val="80000"/>
+            </a:srgbClr>
+          </a:solidFill>
+          <a:ln>
+            <a:noFill/>
+          </a:ln>
+        </p:spPr>
+        <p:style>
+          <a:lnRef idx="2">
+            <a:schemeClr val="accent1">
+              <a:shade val="50000"/>
+            </a:schemeClr>
+          </a:lnRef>
+          <a:fillRef idx="1">
+            <a:schemeClr val="accent1"/>
+          </a:fillRef>
+          <a:effectRef idx="0">
+            <a:schemeClr val="accent1"/>
+          </a:effectRef>
+          <a:fontRef idx="minor">
+            <a:schemeClr val="lt1"/>
+          </a:fontRef>
+        </p:style>
+        <p:txBody>
+          <a:bodyPr rtlCol="0" anchor="ctr"/>
+          <a:lstStyle/>
+          <a:p>
+            <a:pPr marL="0" marR="0" lvl="0" indent="0" algn="ctr" defTabSz="914400" rtl="0" eaLnBrk="1" fontAlgn="auto" latinLnBrk="0" hangingPunct="1">
+              <a:lnSpc>
+                <a:spcPct val="100000"/>
+              </a:lnSpc>
+              <a:spcBef>
+                <a:spcPts val="0"/>
+              </a:spcBef>
+              <a:spcAft>
+                <a:spcPts val="0"/>
+              </a:spcAft>
+              <a:buClrTx/>
+              <a:buSzTx/>
+              <a:buFontTx/>
+              <a:buNone/>
+              <a:tabLst/>
+              <a:defRPr/>
+            </a:pPr>
+            <a:endParaRPr kumimoji="0" lang="en-US" sz="1800" b="0" i="0" u="none" strike="noStrike" kern="1200" cap="none" spc="0" normalizeH="0" baseline="0" noProof="0">
+              <a:ln>
+                <a:noFill/>
+              </a:ln>
+              <a:solidFill>
+                <a:prstClr val="white"/>
+              </a:solidFill>
+              <a:effectLst/>
+              <a:uLnTx/>
+              <a:uFillTx/>
+              <a:latin typeface="Calibri" panose="020F0502020204030204"/>
+              <a:ea typeface="+mn-ea"/>
+              <a:cs typeface="+mn-cs"/>
+            </a:endParaRPr>
+          </a:p>
+        </p:txBody>
+      </p:sp>
+      <p:pic>
+        <p:nvPicPr>
+          <p:cNvPr id="7" name="Imagen 6">
+            <a:extLst>
+              <a:ext uri="{FF2B5EF4-FFF2-40B4-BE49-F238E27FC236}">
+                <a16:creationId xmlns:a16="http://schemas.microsoft.com/office/drawing/2014/main" id="{CAF7C69B-530B-4D33-A5D7-6A27210E7CB0}"/>
+              </a:ext>
+            </a:extLst>
+          </p:cNvPr>
+          <p:cNvPicPr>
+            <a:picLocks noChangeAspect="1"/>
+          </p:cNvPicPr>
+          <p:nvPr/>
+        </p:nvPicPr>
+        <p:blipFill rotWithShape="1">
+          <a:blip r:embed="rId2">
+            <a:extLst>
+              <a:ext uri="{28A0092B-C50C-407E-A947-70E740481C1C}">
+                <a14:useLocalDpi xmlns:a14="http://schemas.microsoft.com/office/drawing/2010/main" val="0"/>
+              </a:ext>
+            </a:extLst>
+          </a:blip>
+          <a:srcRect r="3" b="244"/>
+          <a:stretch/>
+        </p:blipFill>
+        <p:spPr>
+          <a:xfrm>
+            <a:off x="6750141" y="-2"/>
+            <a:ext cx="5441859" cy="5654940"/>
+          </a:xfrm>
+          <a:custGeom>
+            <a:avLst/>
+            <a:gdLst>
+              <a:gd name="connsiteX0" fmla="*/ 1041368 w 5441859"/>
+              <a:gd name="connsiteY0" fmla="*/ 0 h 5654940"/>
+              <a:gd name="connsiteX1" fmla="*/ 5441859 w 5441859"/>
+              <a:gd name="connsiteY1" fmla="*/ 0 h 5654940"/>
+              <a:gd name="connsiteX2" fmla="*/ 5441859 w 5441859"/>
+              <a:gd name="connsiteY2" fmla="*/ 4820612 h 5654940"/>
+              <a:gd name="connsiteX3" fmla="*/ 5285166 w 5441859"/>
+              <a:gd name="connsiteY3" fmla="*/ 4957981 h 5654940"/>
+              <a:gd name="connsiteX4" fmla="*/ 3267719 w 5441859"/>
+              <a:gd name="connsiteY4" fmla="*/ 5654940 h 5654940"/>
+              <a:gd name="connsiteX5" fmla="*/ 0 w 5441859"/>
+              <a:gd name="connsiteY5" fmla="*/ 2387221 h 5654940"/>
+              <a:gd name="connsiteX6" fmla="*/ 957093 w 5441859"/>
+              <a:gd name="connsiteY6" fmla="*/ 76595 h 5654940"/>
+            </a:gdLst>
+            <a:ahLst/>
+            <a:cxnLst>
+              <a:cxn ang="0">
+                <a:pos x="connsiteX0" y="connsiteY0"/>
+              </a:cxn>
+              <a:cxn ang="0">
+                <a:pos x="connsiteX1" y="connsiteY1"/>
+              </a:cxn>
+              <a:cxn ang="0">
+                <a:pos x="connsiteX2" y="connsiteY2"/>
+              </a:cxn>
+              <a:cxn ang="0">
+                <a:pos x="connsiteX3" y="connsiteY3"/>
+              </a:cxn>
+              <a:cxn ang="0">
+                <a:pos x="connsiteX4" y="connsiteY4"/>
+              </a:cxn>
+              <a:cxn ang="0">
+                <a:pos x="connsiteX5" y="connsiteY5"/>
+              </a:cxn>
+              <a:cxn ang="0">
+                <a:pos x="connsiteX6" y="connsiteY6"/>
+              </a:cxn>
+            </a:cxnLst>
+            <a:rect l="l" t="t" r="r" b="b"/>
+            <a:pathLst>
+              <a:path w="5441859" h="5654940">
+                <a:moveTo>
+                  <a:pt x="1041368" y="0"/>
+                </a:moveTo>
+                <a:lnTo>
+                  <a:pt x="5441859" y="0"/>
+                </a:lnTo>
+                <a:lnTo>
+                  <a:pt x="5441859" y="4820612"/>
+                </a:lnTo>
+                <a:lnTo>
+                  <a:pt x="5285166" y="4957981"/>
+                </a:lnTo>
+                <a:cubicBezTo>
+                  <a:pt x="4729628" y="5394557"/>
+                  <a:pt x="4029081" y="5654940"/>
+                  <a:pt x="3267719" y="5654940"/>
+                </a:cubicBezTo>
+                <a:cubicBezTo>
+                  <a:pt x="1463008" y="5654940"/>
+                  <a:pt x="0" y="4191932"/>
+                  <a:pt x="0" y="2387221"/>
+                </a:cubicBezTo>
+                <a:cubicBezTo>
+                  <a:pt x="0" y="1484866"/>
+                  <a:pt x="365752" y="667936"/>
+                  <a:pt x="957093" y="76595"/>
+                </a:cubicBezTo>
+                <a:close/>
+              </a:path>
+            </a:pathLst>
+          </a:custGeom>
+        </p:spPr>
+      </p:pic>
+    </p:spTree>
+    <p:extLst>
+      <p:ext uri="{BB962C8B-B14F-4D97-AF65-F5344CB8AC3E}">
+        <p14:creationId xmlns:p14="http://schemas.microsoft.com/office/powerpoint/2010/main" val="674660512"/>
+      </p:ext>
+    </p:extLst>
+  </p:cSld>
+  <p:clrMapOvr>
+    <a:overrideClrMapping bg1="dk1" tx1="lt1" bg2="dk2" tx2="lt2" accent1="accent1" accent2="accent2" accent3="accent3" accent4="accent4" accent5="accent5" accent6="accent6" hlink="hlink" folHlink="folHlink"/>
+  </p:clrMapOvr>
+</p:sld>
+</file>
+
+<file path=ppt/slides/slide4.xml><?xml version="1.0" encoding="utf-8"?>
+<p:sld xmlns:a="http://schemas.openxmlformats.org/drawingml/2006/main" xmlns:r="http://schemas.openxmlformats.org/officeDocument/2006/relationships" xmlns:p="http://schemas.openxmlformats.org/presentationml/2006/main">
+  <p:cSld>
+    <p:bg>
+      <p:bgPr>
+        <a:solidFill>
+          <a:schemeClr val="bg1"/>
+        </a:solidFill>
+        <a:effectLst/>
+      </p:bgPr>
+    </p:bg>
+    <p:spTree>
+      <p:nvGrpSpPr>
+        <p:cNvPr id="1" name=""/>
+        <p:cNvGrpSpPr/>
+        <p:nvPr/>
+      </p:nvGrpSpPr>
+      <p:grpSpPr>
+        <a:xfrm>
+          <a:off x="0" y="0"/>
+          <a:ext cx="0" cy="0"/>
+          <a:chOff x="0" y="0"/>
+          <a:chExt cx="0" cy="0"/>
+        </a:xfrm>
+      </p:grpSpPr>
+      <p:pic>
+        <p:nvPicPr>
+          <p:cNvPr id="5" name="Imagen 4">
+            <a:extLst>
+              <a:ext uri="{FF2B5EF4-FFF2-40B4-BE49-F238E27FC236}">
+                <a16:creationId xmlns:a16="http://schemas.microsoft.com/office/drawing/2014/main" id="{4A193C05-8401-47AA-83EE-59D365431C61}"/>
+              </a:ext>
+            </a:extLst>
+          </p:cNvPr>
+          <p:cNvPicPr>
+            <a:picLocks noChangeAspect="1"/>
+          </p:cNvPicPr>
+          <p:nvPr/>
+        </p:nvPicPr>
+        <p:blipFill rotWithShape="1">
+          <a:blip r:embed="rId2">
+            <a:extLst>
+              <a:ext uri="{28A0092B-C50C-407E-A947-70E740481C1C}">
+                <a14:useLocalDpi xmlns:a14="http://schemas.microsoft.com/office/drawing/2010/main" val="0"/>
+              </a:ext>
+            </a:extLst>
+          </a:blip>
+          <a:srcRect t="2130" r="-1" b="84"/>
+          <a:stretch/>
+        </p:blipFill>
+        <p:spPr>
+          <a:xfrm>
+            <a:off x="-1" y="10"/>
+            <a:ext cx="12192000" cy="6857990"/>
+          </a:xfrm>
+          <a:prstGeom prst="rect">
+            <a:avLst/>
+          </a:prstGeom>
+        </p:spPr>
+      </p:pic>
+      <p:sp>
+        <p:nvSpPr>
+          <p:cNvPr id="10" name="Freeform 5">
+            <a:extLst>
+              <a:ext uri="{FF2B5EF4-FFF2-40B4-BE49-F238E27FC236}">
+                <a16:creationId xmlns:a16="http://schemas.microsoft.com/office/drawing/2014/main" id="{3CD9DF72-87A3-404E-A828-84CBF11A8303}"/>
+              </a:ext>
+              <a:ext uri="{C183D7F6-B498-43B3-948B-1728B52AA6E4}">
+                <adec:decorative xmlns:adec="http://schemas.microsoft.com/office/drawing/2017/decorative" val="1"/>
+              </a:ext>
+            </a:extLst>
+          </p:cNvPr>
+          <p:cNvSpPr>
+            <a:spLocks noGrp="1" noRot="1" noChangeAspect="1" noMove="1" noResize="1" noEditPoints="1" noAdjustHandles="1" noChangeArrowheads="1" noChangeShapeType="1" noTextEdit="1"/>
+          </p:cNvSpPr>
+          <p:nvPr>
+            <p:extLst>
+              <p:ext uri="{386F3935-93C4-4BCD-93E2-E3B085C9AB24}">
+                <p16:designElem xmlns:p16="http://schemas.microsoft.com/office/powerpoint/2015/main" val="1"/>
+              </p:ext>
+            </p:extLst>
+          </p:nvPr>
+        </p:nvSpPr>
+        <p:spPr bwMode="grayWhite">
+          <a:xfrm flipH="1">
+            <a:off x="0" y="998175"/>
+            <a:ext cx="6017172" cy="5859825"/>
+          </a:xfrm>
+          <a:custGeom>
+            <a:avLst/>
+            <a:gdLst>
+              <a:gd name="T0" fmla="*/ 1333 w 1333"/>
+              <a:gd name="T1" fmla="*/ 1031 h 1298"/>
+              <a:gd name="T2" fmla="*/ 1333 w 1333"/>
+              <a:gd name="T3" fmla="*/ 380 h 1298"/>
+              <a:gd name="T4" fmla="*/ 706 w 1333"/>
+              <a:gd name="T5" fmla="*/ 0 h 1298"/>
+              <a:gd name="T6" fmla="*/ 0 w 1333"/>
+              <a:gd name="T7" fmla="*/ 706 h 1298"/>
+              <a:gd name="T8" fmla="*/ 323 w 1333"/>
+              <a:gd name="T9" fmla="*/ 1298 h 1298"/>
+              <a:gd name="T10" fmla="*/ 1090 w 1333"/>
+              <a:gd name="T11" fmla="*/ 1298 h 1298"/>
+              <a:gd name="T12" fmla="*/ 1333 w 1333"/>
+              <a:gd name="T13" fmla="*/ 1031 h 1298"/>
+            </a:gdLst>
+            <a:ahLst/>
+            <a:cxnLst>
+              <a:cxn ang="0">
+                <a:pos x="T0" y="T1"/>
+              </a:cxn>
+              <a:cxn ang="0">
+                <a:pos x="T2" y="T3"/>
+              </a:cxn>
+              <a:cxn ang="0">
+                <a:pos x="T4" y="T5"/>
+              </a:cxn>
+              <a:cxn ang="0">
+                <a:pos x="T6" y="T7"/>
+              </a:cxn>
+              <a:cxn ang="0">
+                <a:pos x="T8" y="T9"/>
+              </a:cxn>
+              <a:cxn ang="0">
+                <a:pos x="T10" y="T11"/>
+              </a:cxn>
+              <a:cxn ang="0">
+                <a:pos x="T12" y="T13"/>
+              </a:cxn>
+            </a:cxnLst>
+            <a:rect l="0" t="0" r="r" b="b"/>
+            <a:pathLst>
+              <a:path w="1333" h="1298">
+                <a:moveTo>
+                  <a:pt x="1333" y="1031"/>
+                </a:moveTo>
+                <a:cubicBezTo>
+                  <a:pt x="1333" y="380"/>
+                  <a:pt x="1333" y="380"/>
+                  <a:pt x="1333" y="380"/>
+                </a:cubicBezTo>
+                <a:cubicBezTo>
+                  <a:pt x="1215" y="154"/>
+                  <a:pt x="979" y="0"/>
+                  <a:pt x="706" y="0"/>
+                </a:cubicBezTo>
+                <a:cubicBezTo>
+                  <a:pt x="317" y="0"/>
+                  <a:pt x="0" y="316"/>
+                  <a:pt x="0" y="706"/>
+                </a:cubicBezTo>
+                <a:cubicBezTo>
+                  <a:pt x="0" y="954"/>
+                  <a:pt x="129" y="1172"/>
+                  <a:pt x="323" y="1298"/>
+                </a:cubicBezTo>
+                <a:cubicBezTo>
+                  <a:pt x="1090" y="1298"/>
+                  <a:pt x="1090" y="1298"/>
+                  <a:pt x="1090" y="1298"/>
+                </a:cubicBezTo>
+                <a:cubicBezTo>
+                  <a:pt x="1193" y="1232"/>
+                  <a:pt x="1276" y="1140"/>
+                  <a:pt x="1333" y="1031"/>
+                </a:cubicBezTo>
+                <a:close/>
+              </a:path>
+            </a:pathLst>
+          </a:custGeom>
+          <a:solidFill>
+            <a:schemeClr val="bg1">
+              <a:alpha val="75000"/>
+            </a:schemeClr>
+          </a:solidFill>
+          <a:ln w="50800" cap="sq" cmpd="dbl">
+            <a:noFill/>
+            <a:miter lim="800000"/>
+          </a:ln>
+          <a:effectLst/>
+        </p:spPr>
+        <p:txBody>
+          <a:bodyPr vert="horz" lIns="91440" tIns="45720" rIns="91440" bIns="45720" rtlCol="0" anchor="t">
+            <a:normAutofit/>
+          </a:bodyPr>
+          <a:lstStyle/>
+          <a:p>
+            <a:pPr algn="ctr">
+              <a:spcAft>
+                <a:spcPts val="1000"/>
+              </a:spcAft>
+              <a:buClr>
+                <a:schemeClr val="tx1"/>
+              </a:buClr>
+              <a:buSzPct val="100000"/>
+              <a:buFont typeface="Arial"/>
+              <a:buNone/>
+            </a:pPr>
+            <a:endParaRPr lang="en-US" sz="1600" cap="all"/>
+          </a:p>
+        </p:txBody>
+      </p:sp>
+      <p:sp>
+        <p:nvSpPr>
+          <p:cNvPr id="2" name="Título 1">
+            <a:extLst>
+              <a:ext uri="{FF2B5EF4-FFF2-40B4-BE49-F238E27FC236}">
+                <a16:creationId xmlns:a16="http://schemas.microsoft.com/office/drawing/2014/main" id="{066FEE7C-D49A-4D82-A362-D8B9B8154692}"/>
+              </a:ext>
+            </a:extLst>
+          </p:cNvPr>
+          <p:cNvSpPr>
+            <a:spLocks noGrp="1"/>
+          </p:cNvSpPr>
+          <p:nvPr>
+            <p:ph type="title"/>
+          </p:nvPr>
+        </p:nvSpPr>
+        <p:spPr>
+          <a:xfrm>
+            <a:off x="709448" y="1913950"/>
+            <a:ext cx="4204137" cy="1342754"/>
+          </a:xfrm>
+        </p:spPr>
+        <p:txBody>
+          <a:bodyPr>
+            <a:normAutofit/>
+          </a:bodyPr>
+          <a:lstStyle/>
+          <a:p>
+            <a:pPr algn="ctr"/>
+            <a:r>
+              <a:rPr lang="es-ES" sz="3600"/>
+              <a:t>Objetivos Específicos</a:t>
+            </a:r>
+            <a:endParaRPr lang="es-MX" sz="3600"/>
+          </a:p>
+        </p:txBody>
+      </p:sp>
+      <p:cxnSp>
+        <p:nvCxnSpPr>
+          <p:cNvPr id="12" name="Straight Connector 11">
+            <a:extLst>
+              <a:ext uri="{FF2B5EF4-FFF2-40B4-BE49-F238E27FC236}">
+                <a16:creationId xmlns:a16="http://schemas.microsoft.com/office/drawing/2014/main" id="{20E3A342-4D61-4E3F-AF90-1AB42AEB96CC}"/>
+              </a:ext>
+              <a:ext uri="{C183D7F6-B498-43B3-948B-1728B52AA6E4}">
+                <adec:decorative xmlns:adec="http://schemas.microsoft.com/office/drawing/2017/decorative" val="1"/>
+              </a:ext>
+            </a:extLst>
+          </p:cNvPr>
+          <p:cNvCxnSpPr>
+            <a:cxnSpLocks noGrp="1" noRot="1" noChangeAspect="1" noMove="1" noResize="1" noEditPoints="1" noAdjustHandles="1" noChangeArrowheads="1" noChangeShapeType="1"/>
+          </p:cNvCxnSpPr>
+          <p:nvPr>
+            <p:extLst>
+              <p:ext uri="{386F3935-93C4-4BCD-93E2-E3B085C9AB24}">
+                <p16:designElem xmlns:p16="http://schemas.microsoft.com/office/powerpoint/2015/main" val="1"/>
+              </p:ext>
+            </p:extLst>
+          </p:nvPr>
+        </p:nvCxnSpPr>
+        <p:spPr>
+          <a:xfrm>
+            <a:off x="2287051" y="3337139"/>
+            <a:ext cx="935420" cy="0"/>
+          </a:xfrm>
+          <a:prstGeom prst="line">
+            <a:avLst/>
+          </a:prstGeom>
+          <a:ln w="25400" cap="sq">
+            <a:solidFill>
+              <a:schemeClr val="tx1">
+                <a:lumMod val="85000"/>
+                <a:lumOff val="15000"/>
+              </a:schemeClr>
+            </a:solidFill>
+            <a:bevel/>
+          </a:ln>
+        </p:spPr>
+        <p:style>
+          <a:lnRef idx="1">
+            <a:schemeClr val="accent1"/>
+          </a:lnRef>
+          <a:fillRef idx="0">
+            <a:schemeClr val="accent1"/>
+          </a:fillRef>
+          <a:effectRef idx="0">
+            <a:schemeClr val="accent1"/>
+          </a:effectRef>
+          <a:fontRef idx="minor">
+            <a:schemeClr val="tx1"/>
+          </a:fontRef>
+        </p:style>
+      </p:cxnSp>
+      <p:sp>
+        <p:nvSpPr>
+          <p:cNvPr id="3" name="Marcador de contenido 2">
+            <a:extLst>
+              <a:ext uri="{FF2B5EF4-FFF2-40B4-BE49-F238E27FC236}">
+                <a16:creationId xmlns:a16="http://schemas.microsoft.com/office/drawing/2014/main" id="{428E6BD9-FA51-4559-B5B3-97DA8A3592A1}"/>
+              </a:ext>
+            </a:extLst>
+          </p:cNvPr>
+          <p:cNvSpPr>
+            <a:spLocks noGrp="1"/>
+          </p:cNvSpPr>
+          <p:nvPr>
+            <p:ph idx="1"/>
+          </p:nvPr>
+        </p:nvSpPr>
+        <p:spPr>
+          <a:xfrm>
+            <a:off x="525516" y="3417573"/>
+            <a:ext cx="4593021" cy="3009858"/>
+          </a:xfrm>
+        </p:spPr>
+        <p:txBody>
+          <a:bodyPr anchor="ctr">
+            <a:normAutofit/>
+          </a:bodyPr>
+          <a:lstStyle/>
+          <a:p>
+            <a:r>
+              <a:rPr lang="es-ES" sz="1700" dirty="0"/>
+              <a:t>Encontrar la inecuación del paraboloide para definir el volumen del tazón.</a:t>
+            </a:r>
+          </a:p>
+          <a:p>
+            <a:r>
+              <a:rPr lang="es-ES" sz="1700" dirty="0"/>
+              <a:t>Escribir el código para aplicar el método de la integración de Montecarlo al volumen.</a:t>
+            </a:r>
+          </a:p>
+          <a:p>
+            <a:r>
+              <a:rPr lang="es-ES" sz="1700" dirty="0"/>
+              <a:t>Aplicar el código a un valor cada vez más alto de puntos aleatorios para tener un mejor estimado del volumen.</a:t>
+            </a:r>
+          </a:p>
+          <a:p>
+            <a:r>
+              <a:rPr lang="es-ES" sz="1700" dirty="0"/>
+              <a:t>Comparar el volumen encontrado con el volumen real.</a:t>
+            </a:r>
+          </a:p>
+          <a:p>
+            <a:endParaRPr lang="es-MX" sz="1700" dirty="0"/>
+          </a:p>
+        </p:txBody>
+      </p:sp>
+    </p:spTree>
+    <p:extLst>
+      <p:ext uri="{BB962C8B-B14F-4D97-AF65-F5344CB8AC3E}">
+        <p14:creationId xmlns:p14="http://schemas.microsoft.com/office/powerpoint/2010/main" val="1204171073"/>
       </p:ext>
     </p:extLst>
   </p:cSld>
@@ -4073,7 +5224,7 @@
 </p:sld>
 </file>
 
-<file path=ppt/slides/slide3.xml><?xml version="1.0" encoding="utf-8"?>
+<file path=ppt/slides/slide5.xml><?xml version="1.0" encoding="utf-8"?>
 <p:sld xmlns:a="http://schemas.openxmlformats.org/drawingml/2006/main" xmlns:r="http://schemas.openxmlformats.org/officeDocument/2006/relationships" xmlns:p="http://schemas.openxmlformats.org/presentationml/2006/main">
   <p:cSld>
     <p:spTree>
@@ -4095,7 +5246,7 @@
           <p:cNvPr id="2" name="Título 1">
             <a:extLst>
               <a:ext uri="{FF2B5EF4-FFF2-40B4-BE49-F238E27FC236}">
-                <a16:creationId xmlns:a16="http://schemas.microsoft.com/office/drawing/2014/main" id="{35346DB6-E279-42EF-B0D8-91E91F27AD9C}"/>
+                <a16:creationId xmlns:a16="http://schemas.microsoft.com/office/drawing/2014/main" id="{806187D7-AA20-41AA-B99D-889A87572EB0}"/>
               </a:ext>
             </a:extLst>
           </p:cNvPr>
@@ -4111,7 +5262,11 @@
           <a:bodyPr/>
           <a:lstStyle/>
           <a:p>
-            <a:endParaRPr lang="es-MX"/>
+            <a:r>
+              <a:rPr lang="es-ES" dirty="0"/>
+              <a:t>Modelo del problema</a:t>
+            </a:r>
+            <a:endParaRPr lang="es-MX" dirty="0"/>
           </a:p>
         </p:txBody>
       </p:sp>
@@ -4120,7 +5275,7 @@
           <p:cNvPr id="3" name="Marcador de contenido 2">
             <a:extLst>
               <a:ext uri="{FF2B5EF4-FFF2-40B4-BE49-F238E27FC236}">
-                <a16:creationId xmlns:a16="http://schemas.microsoft.com/office/drawing/2014/main" id="{00FC6118-681F-464B-B829-6CB76C53FFCC}"/>
+                <a16:creationId xmlns:a16="http://schemas.microsoft.com/office/drawing/2014/main" id="{AF4FB721-2F3D-44F2-9AF0-DDCA019A88E9}"/>
               </a:ext>
             </a:extLst>
           </p:cNvPr>
@@ -4136,14 +5291,14 @@
           <a:bodyPr/>
           <a:lstStyle/>
           <a:p>
-            <a:endParaRPr lang="es-MX"/>
+            <a:endParaRPr lang="es-MX" dirty="0"/>
           </a:p>
         </p:txBody>
       </p:sp>
     </p:spTree>
     <p:extLst>
       <p:ext uri="{BB962C8B-B14F-4D97-AF65-F5344CB8AC3E}">
-        <p14:creationId xmlns:p14="http://schemas.microsoft.com/office/powerpoint/2010/main" val="674660512"/>
+        <p14:creationId xmlns:p14="http://schemas.microsoft.com/office/powerpoint/2010/main" val="1003661901"/>
       </p:ext>
     </p:extLst>
   </p:cSld>
@@ -4153,7 +5308,7 @@
 </p:sld>
 </file>
 
-<file path=ppt/slides/slide4.xml><?xml version="1.0" encoding="utf-8"?>
+<file path=ppt/slides/slide6.xml><?xml version="1.0" encoding="utf-8"?>
 <p:sld xmlns:a="http://schemas.openxmlformats.org/drawingml/2006/main" xmlns:r="http://schemas.openxmlformats.org/officeDocument/2006/relationships" xmlns:p="http://schemas.openxmlformats.org/presentationml/2006/main">
   <p:cSld>
     <p:spTree>
@@ -4175,7 +5330,7 @@
           <p:cNvPr id="2" name="Título 1">
             <a:extLst>
               <a:ext uri="{FF2B5EF4-FFF2-40B4-BE49-F238E27FC236}">
-                <a16:creationId xmlns:a16="http://schemas.microsoft.com/office/drawing/2014/main" id="{066FEE7C-D49A-4D82-A362-D8B9B8154692}"/>
+                <a16:creationId xmlns:a16="http://schemas.microsoft.com/office/drawing/2014/main" id="{FD7A3E2D-BB34-4D6F-813F-7220B70E9CC4}"/>
               </a:ext>
             </a:extLst>
           </p:cNvPr>
@@ -4191,7 +5346,11 @@
           <a:bodyPr/>
           <a:lstStyle/>
           <a:p>
-            <a:endParaRPr lang="es-MX"/>
+            <a:r>
+              <a:rPr lang="es-ES" dirty="0"/>
+              <a:t>Solución del problema</a:t>
+            </a:r>
+            <a:endParaRPr lang="es-MX" dirty="0"/>
           </a:p>
         </p:txBody>
       </p:sp>
@@ -4200,7 +5359,7 @@
           <p:cNvPr id="3" name="Marcador de contenido 2">
             <a:extLst>
               <a:ext uri="{FF2B5EF4-FFF2-40B4-BE49-F238E27FC236}">
-                <a16:creationId xmlns:a16="http://schemas.microsoft.com/office/drawing/2014/main" id="{428E6BD9-FA51-4559-B5B3-97DA8A3592A1}"/>
+                <a16:creationId xmlns:a16="http://schemas.microsoft.com/office/drawing/2014/main" id="{A5E2C95C-E335-4703-9215-44AF17BBD76B}"/>
               </a:ext>
             </a:extLst>
           </p:cNvPr>
@@ -4223,7 +5382,531 @@
     </p:spTree>
     <p:extLst>
       <p:ext uri="{BB962C8B-B14F-4D97-AF65-F5344CB8AC3E}">
-        <p14:creationId xmlns:p14="http://schemas.microsoft.com/office/powerpoint/2010/main" val="1204171073"/>
+        <p14:creationId xmlns:p14="http://schemas.microsoft.com/office/powerpoint/2010/main" val="443167669"/>
+      </p:ext>
+    </p:extLst>
+  </p:cSld>
+  <p:clrMapOvr>
+    <a:masterClrMapping/>
+  </p:clrMapOvr>
+</p:sld>
+</file>
+
+<file path=ppt/slides/slide7.xml><?xml version="1.0" encoding="utf-8"?>
+<p:sld xmlns:a="http://schemas.openxmlformats.org/drawingml/2006/main" xmlns:r="http://schemas.openxmlformats.org/officeDocument/2006/relationships" xmlns:p="http://schemas.openxmlformats.org/presentationml/2006/main">
+  <p:cSld>
+    <p:spTree>
+      <p:nvGrpSpPr>
+        <p:cNvPr id="1" name=""/>
+        <p:cNvGrpSpPr/>
+        <p:nvPr/>
+      </p:nvGrpSpPr>
+      <p:grpSpPr>
+        <a:xfrm>
+          <a:off x="0" y="0"/>
+          <a:ext cx="0" cy="0"/>
+          <a:chOff x="0" y="0"/>
+          <a:chExt cx="0" cy="0"/>
+        </a:xfrm>
+      </p:grpSpPr>
+      <p:sp>
+        <p:nvSpPr>
+          <p:cNvPr id="2" name="Título 1">
+            <a:extLst>
+              <a:ext uri="{FF2B5EF4-FFF2-40B4-BE49-F238E27FC236}">
+                <a16:creationId xmlns:a16="http://schemas.microsoft.com/office/drawing/2014/main" id="{D38DE8DA-72FD-4B3A-B281-14F1F1A4B73C}"/>
+              </a:ext>
+            </a:extLst>
+          </p:cNvPr>
+          <p:cNvSpPr>
+            <a:spLocks noGrp="1"/>
+          </p:cNvSpPr>
+          <p:nvPr>
+            <p:ph type="title"/>
+          </p:nvPr>
+        </p:nvSpPr>
+        <p:spPr/>
+        <p:txBody>
+          <a:bodyPr/>
+          <a:lstStyle/>
+          <a:p>
+            <a:r>
+              <a:rPr lang="es-ES" dirty="0"/>
+              <a:t>Visualización del problema</a:t>
+            </a:r>
+            <a:endParaRPr lang="es-MX" dirty="0"/>
+          </a:p>
+        </p:txBody>
+      </p:sp>
+      <p:sp>
+        <p:nvSpPr>
+          <p:cNvPr id="3" name="Marcador de contenido 2">
+            <a:extLst>
+              <a:ext uri="{FF2B5EF4-FFF2-40B4-BE49-F238E27FC236}">
+                <a16:creationId xmlns:a16="http://schemas.microsoft.com/office/drawing/2014/main" id="{25ECE901-89D2-41EC-BA72-0ABA5C5429A0}"/>
+              </a:ext>
+            </a:extLst>
+          </p:cNvPr>
+          <p:cNvSpPr>
+            <a:spLocks noGrp="1"/>
+          </p:cNvSpPr>
+          <p:nvPr>
+            <p:ph idx="1"/>
+          </p:nvPr>
+        </p:nvSpPr>
+        <p:spPr/>
+        <p:txBody>
+          <a:bodyPr/>
+          <a:lstStyle/>
+          <a:p>
+            <a:endParaRPr lang="es-MX"/>
+          </a:p>
+        </p:txBody>
+      </p:sp>
+    </p:spTree>
+    <p:extLst>
+      <p:ext uri="{BB962C8B-B14F-4D97-AF65-F5344CB8AC3E}">
+        <p14:creationId xmlns:p14="http://schemas.microsoft.com/office/powerpoint/2010/main" val="2131569513"/>
+      </p:ext>
+    </p:extLst>
+  </p:cSld>
+  <p:clrMapOvr>
+    <a:masterClrMapping/>
+  </p:clrMapOvr>
+</p:sld>
+</file>
+
+<file path=ppt/slides/slide8.xml><?xml version="1.0" encoding="utf-8"?>
+<p:sld xmlns:a="http://schemas.openxmlformats.org/drawingml/2006/main" xmlns:r="http://schemas.openxmlformats.org/officeDocument/2006/relationships" xmlns:p="http://schemas.openxmlformats.org/presentationml/2006/main">
+  <p:cSld>
+    <p:spTree>
+      <p:nvGrpSpPr>
+        <p:cNvPr id="1" name=""/>
+        <p:cNvGrpSpPr/>
+        <p:nvPr/>
+      </p:nvGrpSpPr>
+      <p:grpSpPr>
+        <a:xfrm>
+          <a:off x="0" y="0"/>
+          <a:ext cx="0" cy="0"/>
+          <a:chOff x="0" y="0"/>
+          <a:chExt cx="0" cy="0"/>
+        </a:xfrm>
+      </p:grpSpPr>
+      <p:sp>
+        <p:nvSpPr>
+          <p:cNvPr id="2" name="Título 1">
+            <a:extLst>
+              <a:ext uri="{FF2B5EF4-FFF2-40B4-BE49-F238E27FC236}">
+                <a16:creationId xmlns:a16="http://schemas.microsoft.com/office/drawing/2014/main" id="{51CA86E7-EB35-4E8C-A874-8CCF743D77E4}"/>
+              </a:ext>
+            </a:extLst>
+          </p:cNvPr>
+          <p:cNvSpPr>
+            <a:spLocks noGrp="1"/>
+          </p:cNvSpPr>
+          <p:nvPr>
+            <p:ph type="title"/>
+          </p:nvPr>
+        </p:nvSpPr>
+        <p:spPr/>
+        <p:txBody>
+          <a:bodyPr/>
+          <a:lstStyle/>
+          <a:p>
+            <a:r>
+              <a:rPr lang="es-ES" dirty="0"/>
+              <a:t>Conclusiones</a:t>
+            </a:r>
+            <a:endParaRPr lang="es-MX" dirty="0"/>
+          </a:p>
+        </p:txBody>
+      </p:sp>
+      <p:sp>
+        <p:nvSpPr>
+          <p:cNvPr id="3" name="Marcador de contenido 2">
+            <a:extLst>
+              <a:ext uri="{FF2B5EF4-FFF2-40B4-BE49-F238E27FC236}">
+                <a16:creationId xmlns:a16="http://schemas.microsoft.com/office/drawing/2014/main" id="{0789CEC3-8501-4A1E-B94B-CED5E6488287}"/>
+              </a:ext>
+            </a:extLst>
+          </p:cNvPr>
+          <p:cNvSpPr>
+            <a:spLocks noGrp="1"/>
+          </p:cNvSpPr>
+          <p:nvPr>
+            <p:ph idx="1"/>
+          </p:nvPr>
+        </p:nvSpPr>
+        <p:spPr/>
+        <p:txBody>
+          <a:bodyPr/>
+          <a:lstStyle/>
+          <a:p>
+            <a:endParaRPr lang="es-MX"/>
+          </a:p>
+        </p:txBody>
+      </p:sp>
+    </p:spTree>
+    <p:extLst>
+      <p:ext uri="{BB962C8B-B14F-4D97-AF65-F5344CB8AC3E}">
+        <p14:creationId xmlns:p14="http://schemas.microsoft.com/office/powerpoint/2010/main" val="4152391237"/>
+      </p:ext>
+    </p:extLst>
+  </p:cSld>
+  <p:clrMapOvr>
+    <a:masterClrMapping/>
+  </p:clrMapOvr>
+</p:sld>
+</file>
+
+<file path=ppt/slides/slide9.xml><?xml version="1.0" encoding="utf-8"?>
+<p:sld xmlns:a="http://schemas.openxmlformats.org/drawingml/2006/main" xmlns:r="http://schemas.openxmlformats.org/officeDocument/2006/relationships" xmlns:p="http://schemas.openxmlformats.org/presentationml/2006/main">
+  <p:cSld>
+    <p:bg>
+      <p:bgPr>
+        <a:solidFill>
+          <a:schemeClr val="bg1"/>
+        </a:solidFill>
+        <a:effectLst/>
+      </p:bgPr>
+    </p:bg>
+    <p:spTree>
+      <p:nvGrpSpPr>
+        <p:cNvPr id="1" name=""/>
+        <p:cNvGrpSpPr/>
+        <p:nvPr/>
+      </p:nvGrpSpPr>
+      <p:grpSpPr>
+        <a:xfrm>
+          <a:off x="0" y="0"/>
+          <a:ext cx="0" cy="0"/>
+          <a:chOff x="0" y="0"/>
+          <a:chExt cx="0" cy="0"/>
+        </a:xfrm>
+      </p:grpSpPr>
+      <p:pic>
+        <p:nvPicPr>
+          <p:cNvPr id="7" name="Imagen 6">
+            <a:extLst>
+              <a:ext uri="{FF2B5EF4-FFF2-40B4-BE49-F238E27FC236}">
+                <a16:creationId xmlns:a16="http://schemas.microsoft.com/office/drawing/2014/main" id="{682A029B-2C2F-4E97-A3AF-973C2A1D9A38}"/>
+              </a:ext>
+            </a:extLst>
+          </p:cNvPr>
+          <p:cNvPicPr>
+            <a:picLocks noChangeAspect="1"/>
+          </p:cNvPicPr>
+          <p:nvPr/>
+        </p:nvPicPr>
+        <p:blipFill rotWithShape="1">
+          <a:blip r:embed="rId2">
+            <a:extLst>
+              <a:ext uri="{28A0092B-C50C-407E-A947-70E740481C1C}">
+                <a14:useLocalDpi xmlns:a14="http://schemas.microsoft.com/office/drawing/2010/main" val="0"/>
+              </a:ext>
+            </a:extLst>
+          </a:blip>
+          <a:srcRect t="11334" b="16550"/>
+          <a:stretch/>
+        </p:blipFill>
+        <p:spPr>
+          <a:xfrm>
+            <a:off x="-1" y="10"/>
+            <a:ext cx="12192000" cy="6857990"/>
+          </a:xfrm>
+          <a:prstGeom prst="rect">
+            <a:avLst/>
+          </a:prstGeom>
+        </p:spPr>
+      </p:pic>
+      <p:sp>
+        <p:nvSpPr>
+          <p:cNvPr id="12" name="Freeform 5">
+            <a:extLst>
+              <a:ext uri="{FF2B5EF4-FFF2-40B4-BE49-F238E27FC236}">
+                <a16:creationId xmlns:a16="http://schemas.microsoft.com/office/drawing/2014/main" id="{3CD9DF72-87A3-404E-A828-84CBF11A8303}"/>
+              </a:ext>
+              <a:ext uri="{C183D7F6-B498-43B3-948B-1728B52AA6E4}">
+                <adec:decorative xmlns:adec="http://schemas.microsoft.com/office/drawing/2017/decorative" val="1"/>
+              </a:ext>
+            </a:extLst>
+          </p:cNvPr>
+          <p:cNvSpPr>
+            <a:spLocks noGrp="1" noRot="1" noChangeAspect="1" noMove="1" noResize="1" noEditPoints="1" noAdjustHandles="1" noChangeArrowheads="1" noChangeShapeType="1" noTextEdit="1"/>
+          </p:cNvSpPr>
+          <p:nvPr>
+            <p:extLst>
+              <p:ext uri="{386F3935-93C4-4BCD-93E2-E3B085C9AB24}">
+                <p16:designElem xmlns:p16="http://schemas.microsoft.com/office/powerpoint/2015/main" val="1"/>
+              </p:ext>
+            </p:extLst>
+          </p:nvPr>
+        </p:nvSpPr>
+        <p:spPr bwMode="grayWhite">
+          <a:xfrm flipH="1">
+            <a:off x="0" y="998175"/>
+            <a:ext cx="6017172" cy="5859825"/>
+          </a:xfrm>
+          <a:custGeom>
+            <a:avLst/>
+            <a:gdLst>
+              <a:gd name="T0" fmla="*/ 1333 w 1333"/>
+              <a:gd name="T1" fmla="*/ 1031 h 1298"/>
+              <a:gd name="T2" fmla="*/ 1333 w 1333"/>
+              <a:gd name="T3" fmla="*/ 380 h 1298"/>
+              <a:gd name="T4" fmla="*/ 706 w 1333"/>
+              <a:gd name="T5" fmla="*/ 0 h 1298"/>
+              <a:gd name="T6" fmla="*/ 0 w 1333"/>
+              <a:gd name="T7" fmla="*/ 706 h 1298"/>
+              <a:gd name="T8" fmla="*/ 323 w 1333"/>
+              <a:gd name="T9" fmla="*/ 1298 h 1298"/>
+              <a:gd name="T10" fmla="*/ 1090 w 1333"/>
+              <a:gd name="T11" fmla="*/ 1298 h 1298"/>
+              <a:gd name="T12" fmla="*/ 1333 w 1333"/>
+              <a:gd name="T13" fmla="*/ 1031 h 1298"/>
+            </a:gdLst>
+            <a:ahLst/>
+            <a:cxnLst>
+              <a:cxn ang="0">
+                <a:pos x="T0" y="T1"/>
+              </a:cxn>
+              <a:cxn ang="0">
+                <a:pos x="T2" y="T3"/>
+              </a:cxn>
+              <a:cxn ang="0">
+                <a:pos x="T4" y="T5"/>
+              </a:cxn>
+              <a:cxn ang="0">
+                <a:pos x="T6" y="T7"/>
+              </a:cxn>
+              <a:cxn ang="0">
+                <a:pos x="T8" y="T9"/>
+              </a:cxn>
+              <a:cxn ang="0">
+                <a:pos x="T10" y="T11"/>
+              </a:cxn>
+              <a:cxn ang="0">
+                <a:pos x="T12" y="T13"/>
+              </a:cxn>
+            </a:cxnLst>
+            <a:rect l="0" t="0" r="r" b="b"/>
+            <a:pathLst>
+              <a:path w="1333" h="1298">
+                <a:moveTo>
+                  <a:pt x="1333" y="1031"/>
+                </a:moveTo>
+                <a:cubicBezTo>
+                  <a:pt x="1333" y="380"/>
+                  <a:pt x="1333" y="380"/>
+                  <a:pt x="1333" y="380"/>
+                </a:cubicBezTo>
+                <a:cubicBezTo>
+                  <a:pt x="1215" y="154"/>
+                  <a:pt x="979" y="0"/>
+                  <a:pt x="706" y="0"/>
+                </a:cubicBezTo>
+                <a:cubicBezTo>
+                  <a:pt x="317" y="0"/>
+                  <a:pt x="0" y="316"/>
+                  <a:pt x="0" y="706"/>
+                </a:cubicBezTo>
+                <a:cubicBezTo>
+                  <a:pt x="0" y="954"/>
+                  <a:pt x="129" y="1172"/>
+                  <a:pt x="323" y="1298"/>
+                </a:cubicBezTo>
+                <a:cubicBezTo>
+                  <a:pt x="1090" y="1298"/>
+                  <a:pt x="1090" y="1298"/>
+                  <a:pt x="1090" y="1298"/>
+                </a:cubicBezTo>
+                <a:cubicBezTo>
+                  <a:pt x="1193" y="1232"/>
+                  <a:pt x="1276" y="1140"/>
+                  <a:pt x="1333" y="1031"/>
+                </a:cubicBezTo>
+                <a:close/>
+              </a:path>
+            </a:pathLst>
+          </a:custGeom>
+          <a:solidFill>
+            <a:schemeClr val="bg1">
+              <a:alpha val="75000"/>
+            </a:schemeClr>
+          </a:solidFill>
+          <a:ln w="50800" cap="sq" cmpd="dbl">
+            <a:noFill/>
+            <a:miter lim="800000"/>
+          </a:ln>
+          <a:effectLst/>
+        </p:spPr>
+        <p:txBody>
+          <a:bodyPr vert="horz" lIns="91440" tIns="45720" rIns="91440" bIns="45720" rtlCol="0" anchor="t">
+            <a:normAutofit/>
+          </a:bodyPr>
+          <a:lstStyle/>
+          <a:p>
+            <a:pPr algn="ctr">
+              <a:spcAft>
+                <a:spcPts val="1000"/>
+              </a:spcAft>
+              <a:buClr>
+                <a:schemeClr val="tx1"/>
+              </a:buClr>
+              <a:buSzPct val="100000"/>
+              <a:buFont typeface="Arial"/>
+              <a:buNone/>
+            </a:pPr>
+            <a:endParaRPr lang="en-US" sz="1600" cap="all"/>
+          </a:p>
+        </p:txBody>
+      </p:sp>
+      <p:sp>
+        <p:nvSpPr>
+          <p:cNvPr id="2" name="Título 1">
+            <a:extLst>
+              <a:ext uri="{FF2B5EF4-FFF2-40B4-BE49-F238E27FC236}">
+                <a16:creationId xmlns:a16="http://schemas.microsoft.com/office/drawing/2014/main" id="{E93018B6-CFDE-45E2-8FF3-44383CCBAE8D}"/>
+              </a:ext>
+            </a:extLst>
+          </p:cNvPr>
+          <p:cNvSpPr>
+            <a:spLocks noGrp="1"/>
+          </p:cNvSpPr>
+          <p:nvPr>
+            <p:ph type="title"/>
+          </p:nvPr>
+        </p:nvSpPr>
+        <p:spPr>
+          <a:xfrm>
+            <a:off x="709448" y="1913950"/>
+            <a:ext cx="4204137" cy="1342754"/>
+          </a:xfrm>
+        </p:spPr>
+        <p:txBody>
+          <a:bodyPr>
+            <a:normAutofit/>
+          </a:bodyPr>
+          <a:lstStyle/>
+          <a:p>
+            <a:pPr algn="ctr"/>
+            <a:r>
+              <a:rPr lang="es-ES" dirty="0"/>
+              <a:t>Referencias</a:t>
+            </a:r>
+            <a:endParaRPr lang="es-MX" dirty="0"/>
+          </a:p>
+        </p:txBody>
+      </p:sp>
+      <p:cxnSp>
+        <p:nvCxnSpPr>
+          <p:cNvPr id="14" name="Straight Connector 13">
+            <a:extLst>
+              <a:ext uri="{FF2B5EF4-FFF2-40B4-BE49-F238E27FC236}">
+                <a16:creationId xmlns:a16="http://schemas.microsoft.com/office/drawing/2014/main" id="{20E3A342-4D61-4E3F-AF90-1AB42AEB96CC}"/>
+              </a:ext>
+              <a:ext uri="{C183D7F6-B498-43B3-948B-1728B52AA6E4}">
+                <adec:decorative xmlns:adec="http://schemas.microsoft.com/office/drawing/2017/decorative" val="1"/>
+              </a:ext>
+            </a:extLst>
+          </p:cNvPr>
+          <p:cNvCxnSpPr>
+            <a:cxnSpLocks noGrp="1" noRot="1" noChangeAspect="1" noMove="1" noResize="1" noEditPoints="1" noAdjustHandles="1" noChangeArrowheads="1" noChangeShapeType="1"/>
+          </p:cNvCxnSpPr>
+          <p:nvPr>
+            <p:extLst>
+              <p:ext uri="{386F3935-93C4-4BCD-93E2-E3B085C9AB24}">
+                <p16:designElem xmlns:p16="http://schemas.microsoft.com/office/powerpoint/2015/main" val="1"/>
+              </p:ext>
+            </p:extLst>
+          </p:nvPr>
+        </p:nvCxnSpPr>
+        <p:spPr>
+          <a:xfrm>
+            <a:off x="2287051" y="3337139"/>
+            <a:ext cx="935420" cy="0"/>
+          </a:xfrm>
+          <a:prstGeom prst="line">
+            <a:avLst/>
+          </a:prstGeom>
+          <a:ln w="25400" cap="sq">
+            <a:solidFill>
+              <a:schemeClr val="tx1">
+                <a:lumMod val="85000"/>
+                <a:lumOff val="15000"/>
+              </a:schemeClr>
+            </a:solidFill>
+            <a:bevel/>
+          </a:ln>
+        </p:spPr>
+        <p:style>
+          <a:lnRef idx="1">
+            <a:schemeClr val="accent1"/>
+          </a:lnRef>
+          <a:fillRef idx="0">
+            <a:schemeClr val="accent1"/>
+          </a:fillRef>
+          <a:effectRef idx="0">
+            <a:schemeClr val="accent1"/>
+          </a:effectRef>
+          <a:fontRef idx="minor">
+            <a:schemeClr val="tx1"/>
+          </a:fontRef>
+        </p:style>
+      </p:cxnSp>
+      <p:sp>
+        <p:nvSpPr>
+          <p:cNvPr id="3" name="Marcador de contenido 2">
+            <a:extLst>
+              <a:ext uri="{FF2B5EF4-FFF2-40B4-BE49-F238E27FC236}">
+                <a16:creationId xmlns:a16="http://schemas.microsoft.com/office/drawing/2014/main" id="{DDC5C1B3-16AB-40F3-AFF4-124F19ED78BF}"/>
+              </a:ext>
+            </a:extLst>
+          </p:cNvPr>
+          <p:cNvSpPr>
+            <a:spLocks noGrp="1"/>
+          </p:cNvSpPr>
+          <p:nvPr>
+            <p:ph idx="1"/>
+          </p:nvPr>
+        </p:nvSpPr>
+        <p:spPr>
+          <a:xfrm>
+            <a:off x="525516" y="3417573"/>
+            <a:ext cx="4969762" cy="2619839"/>
+          </a:xfrm>
+        </p:spPr>
+        <p:txBody>
+          <a:bodyPr anchor="ctr">
+            <a:normAutofit/>
+          </a:bodyPr>
+          <a:lstStyle/>
+          <a:p>
+            <a:r>
+              <a:rPr lang="es-MX" sz="2400" dirty="0"/>
+              <a:t>Hiperboloide. (2019, 21 octubre). Recuperado de </a:t>
+            </a:r>
+            <a:r>
+              <a:rPr lang="es-MX" sz="2400" dirty="0">
+                <a:hlinkClick r:id="rId3"/>
+              </a:rPr>
+              <a:t>https://es.wikipedia.org/wiki/Hiperboloide</a:t>
+            </a:r>
+            <a:endParaRPr lang="es-MX" sz="2400" dirty="0"/>
+          </a:p>
+          <a:p>
+            <a:pPr marL="0" indent="0">
+              <a:buNone/>
+            </a:pPr>
+            <a:endParaRPr lang="es-MX" sz="1800" dirty="0"/>
+          </a:p>
+        </p:txBody>
+      </p:sp>
+    </p:spTree>
+    <p:extLst>
+      <p:ext uri="{BB962C8B-B14F-4D97-AF65-F5344CB8AC3E}">
+        <p14:creationId xmlns:p14="http://schemas.microsoft.com/office/powerpoint/2010/main" val="3880154755"/>
       </p:ext>
     </p:extLst>
   </p:cSld>

</xml_diff>